<commit_message>
All presentations, updates from 15.9
</commit_message>
<xml_diff>
--- a/Oemof_Workshop_01_Kickoff_Monday.pptx
+++ b/Oemof_Workshop_01_Kickoff_Monday.pptx
@@ -17173,15 +17173,7 @@
                   <a:schemeClr val="tx1"/>
                 </a:solidFill>
               </a:rPr>
-              <a:t> </a:t>
-            </a:r>
-            <a:r>
-              <a:rPr lang="de-DE" dirty="0" smtClean="0">
-                <a:solidFill>
-                  <a:schemeClr val="tx1"/>
-                </a:solidFill>
-              </a:rPr>
-              <a:t>E-</a:t>
+              <a:t> E-</a:t>
             </a:r>
             <a:r>
               <a:rPr lang="de-DE" dirty="0" err="1" smtClean="0">
@@ -17199,11 +17191,6 @@
               </a:rPr>
               <a:t> MVS</a:t>
             </a:r>
-            <a:endParaRPr lang="de-DE" dirty="0" smtClean="0">
-              <a:solidFill>
-                <a:schemeClr val="tx1"/>
-              </a:solidFill>
-            </a:endParaRPr>
           </a:p>
           <a:p>
             <a:pPr marL="285750" indent="-285750">
@@ -17644,8 +17631,8 @@
         </p:nvSpPr>
         <p:spPr>
           <a:xfrm>
-            <a:off x="628650" y="1452563"/>
-            <a:ext cx="7886700" cy="4652962"/>
+            <a:off x="628649" y="1452563"/>
+            <a:ext cx="8033569" cy="4652962"/>
           </a:xfrm>
         </p:spPr>
         <p:txBody>
@@ -17668,11 +17655,7 @@
             </a:r>
             <a:r>
               <a:rPr lang="de-DE" sz="2400" dirty="0" err="1" smtClean="0"/>
-              <a:t>tutorial</a:t>
-            </a:r>
-            <a:r>
-              <a:rPr lang="de-DE" sz="2400" dirty="0" err="1" smtClean="0"/>
-              <a:t>s</a:t>
+              <a:t>tutorials</a:t>
             </a:r>
             <a:r>
               <a:rPr lang="de-DE" sz="2400" dirty="0" smtClean="0"/>
@@ -17719,45 +17702,39 @@
               <a:rPr lang="de-DE" sz="2400" dirty="0" smtClean="0">
                 <a:hlinkClick r:id="rId3" action="ppaction://hlinkfile"/>
               </a:rPr>
-              <a:t>Agenda </a:t>
-            </a:r>
-            <a:r>
-              <a:rPr lang="de-DE" sz="2400" dirty="0" err="1" smtClean="0">
-                <a:hlinkClick r:id="rId3" action="ppaction://hlinkfile"/>
-              </a:rPr>
+              <a:t>Agenda</a:t>
+            </a:r>
+            <a:r>
+              <a:rPr lang="de-DE" sz="2400" dirty="0" smtClean="0"/>
+              <a:t> </a:t>
+            </a:r>
+            <a:r>
+              <a:rPr lang="de-DE" sz="2400" dirty="0" err="1" smtClean="0"/>
               <a:t>of</a:t>
             </a:r>
             <a:r>
+              <a:rPr lang="de-DE" sz="2400" dirty="0" smtClean="0"/>
+              <a:t> </a:t>
+            </a:r>
+            <a:r>
+              <a:rPr lang="de-DE" sz="2400" dirty="0" err="1" smtClean="0"/>
+              <a:t>the</a:t>
+            </a:r>
+            <a:r>
+              <a:rPr lang="de-DE" sz="2400" dirty="0" smtClean="0"/>
+              <a:t> </a:t>
+            </a:r>
+            <a:r>
+              <a:rPr lang="de-DE" sz="2400" dirty="0" err="1" smtClean="0"/>
+              <a:t>week</a:t>
+            </a:r>
+            <a:r>
               <a:rPr lang="de-DE" sz="2400" dirty="0" smtClean="0">
-                <a:hlinkClick r:id="rId3" action="ppaction://hlinkfile"/>
+                <a:hlinkClick r:id="rId4" action="ppaction://hlinkfile"/>
               </a:rPr>
               <a:t> </a:t>
             </a:r>
-            <a:r>
-              <a:rPr lang="de-DE" sz="2400" dirty="0" err="1" smtClean="0">
-                <a:hlinkClick r:id="rId3" action="ppaction://hlinkfile"/>
-              </a:rPr>
-              <a:t>the</a:t>
-            </a:r>
-            <a:r>
-              <a:rPr lang="de-DE" sz="2400" dirty="0" smtClean="0">
-                <a:hlinkClick r:id="rId3" action="ppaction://hlinkfile"/>
-              </a:rPr>
-              <a:t> </a:t>
-            </a:r>
-            <a:r>
-              <a:rPr lang="de-DE" sz="2400" dirty="0" err="1" smtClean="0">
-                <a:hlinkClick r:id="rId3" action="ppaction://hlinkfile"/>
-              </a:rPr>
-              <a:t>week</a:t>
-            </a:r>
-            <a:r>
-              <a:rPr lang="de-DE" sz="2400" dirty="0" smtClean="0">
-                <a:hlinkClick r:id="rId3" action="ppaction://hlinkfile"/>
-              </a:rPr>
-              <a:t> </a:t>
-            </a:r>
-            <a:endParaRPr lang="de-DE" sz="2400" dirty="0"/>
+            <a:endParaRPr lang="de-DE" sz="2400" dirty="0" smtClean="0"/>
           </a:p>
           <a:p>
             <a:r>

</xml_diff>

<commit_message>
All presentations, updates from 15.9 * Presentations 1, 2, 3 done * Codes for Monday corrected
</commit_message>
<xml_diff>
--- a/Oemof_Workshop_01_Kickoff_Monday.pptx
+++ b/Oemof_Workshop_01_Kickoff_Monday.pptx
@@ -998,12 +998,12 @@
             <a:t>What does MVS from the </a:t>
           </a:r>
           <a:r>
-            <a:rPr lang="en-US" sz="1800" b="1" dirty="0" err="1" smtClean="0">
+            <a:rPr lang="en-US" sz="1800" b="1" dirty="0" smtClean="0">
               <a:latin typeface="Roboto" panose="02000000000000000000" pitchFamily="2" charset="0"/>
               <a:ea typeface="Roboto" panose="02000000000000000000" pitchFamily="2" charset="0"/>
               <a:cs typeface="Roboto" panose="02000000000000000000" pitchFamily="2" charset="0"/>
             </a:rPr>
-            <a:t>oemof</a:t>
+            <a:t>E-Land </a:t>
           </a:r>
           <a:r>
             <a:rPr lang="en-US" sz="1800" b="1" dirty="0" smtClean="0">
@@ -1011,7 +1011,7 @@
               <a:ea typeface="Roboto" panose="02000000000000000000" pitchFamily="2" charset="0"/>
               <a:cs typeface="Roboto" panose="02000000000000000000" pitchFamily="2" charset="0"/>
             </a:rPr>
-            <a:t> toolbox do?</a:t>
+            <a:t>toolbox do?</a:t>
           </a:r>
           <a:endParaRPr lang="en-US" sz="1800" b="1" dirty="0">
             <a:latin typeface="Roboto" panose="02000000000000000000" pitchFamily="2" charset="0"/>
@@ -2074,12 +2074,12 @@
             <a:t>What does MVS from the </a:t>
           </a:r>
           <a:r>
-            <a:rPr lang="en-US" sz="1800" b="1" kern="1200" dirty="0" err="1" smtClean="0">
+            <a:rPr lang="en-US" sz="1800" b="1" kern="1200" dirty="0" smtClean="0">
               <a:latin typeface="Roboto" panose="02000000000000000000" pitchFamily="2" charset="0"/>
               <a:ea typeface="Roboto" panose="02000000000000000000" pitchFamily="2" charset="0"/>
               <a:cs typeface="Roboto" panose="02000000000000000000" pitchFamily="2" charset="0"/>
             </a:rPr>
-            <a:t>oemof</a:t>
+            <a:t>E-Land </a:t>
           </a:r>
           <a:r>
             <a:rPr lang="en-US" sz="1800" b="1" kern="1200" dirty="0" smtClean="0">
@@ -2087,7 +2087,7 @@
               <a:ea typeface="Roboto" panose="02000000000000000000" pitchFamily="2" charset="0"/>
               <a:cs typeface="Roboto" panose="02000000000000000000" pitchFamily="2" charset="0"/>
             </a:rPr>
-            <a:t> toolbox do?</a:t>
+            <a:t>toolbox do?</a:t>
           </a:r>
           <a:endParaRPr lang="en-US" sz="1800" b="1" kern="1200" dirty="0">
             <a:latin typeface="Roboto" panose="02000000000000000000" pitchFamily="2" charset="0"/>
@@ -4660,7 +4660,7 @@
           <a:p>
             <a:fld id="{6BD11D3B-DADA-9042-8997-28ACE677BFD3}" type="datetimeFigureOut">
               <a:rPr lang="de-DE" smtClean="0"/>
-              <a:t>15.09.2019</a:t>
+              <a:t>16.09.2019</a:t>
             </a:fld>
             <a:endParaRPr lang="de-DE"/>
           </a:p>
@@ -17437,7 +17437,7 @@
           <p:nvPr>
             <p:extLst>
               <p:ext uri="{D42A27DB-BD31-4B8C-83A1-F6EECF244321}">
-                <p14:modId xmlns:p14="http://schemas.microsoft.com/office/powerpoint/2010/main" val="1279615069"/>
+                <p14:modId xmlns:p14="http://schemas.microsoft.com/office/powerpoint/2010/main" val="3781758735"/>
               </p:ext>
             </p:extLst>
           </p:nvPr>

</xml_diff>

<commit_message>
All presentations, updates from 15.9 * Presentations 1, 2, 3 done * Codes for Monday done
</commit_message>
<xml_diff>
--- a/Oemof_Workshop_01_Kickoff_Monday.pptx
+++ b/Oemof_Workshop_01_Kickoff_Monday.pptx
@@ -995,23 +995,7 @@
               <a:ea typeface="Roboto" panose="02000000000000000000" pitchFamily="2" charset="0"/>
               <a:cs typeface="Roboto" panose="02000000000000000000" pitchFamily="2" charset="0"/>
             </a:rPr>
-            <a:t>What does MVS from the </a:t>
-          </a:r>
-          <a:r>
-            <a:rPr lang="en-US" sz="1800" b="1" dirty="0" smtClean="0">
-              <a:latin typeface="Roboto" panose="02000000000000000000" pitchFamily="2" charset="0"/>
-              <a:ea typeface="Roboto" panose="02000000000000000000" pitchFamily="2" charset="0"/>
-              <a:cs typeface="Roboto" panose="02000000000000000000" pitchFamily="2" charset="0"/>
-            </a:rPr>
-            <a:t>E-Land </a:t>
-          </a:r>
-          <a:r>
-            <a:rPr lang="en-US" sz="1800" b="1" dirty="0" smtClean="0">
-              <a:latin typeface="Roboto" panose="02000000000000000000" pitchFamily="2" charset="0"/>
-              <a:ea typeface="Roboto" panose="02000000000000000000" pitchFamily="2" charset="0"/>
-              <a:cs typeface="Roboto" panose="02000000000000000000" pitchFamily="2" charset="0"/>
-            </a:rPr>
-            <a:t>toolbox do?</a:t>
+            <a:t>What does MVS from the E-Land toolbox do?</a:t>
           </a:r>
           <a:endParaRPr lang="en-US" sz="1800" b="1" dirty="0">
             <a:latin typeface="Roboto" panose="02000000000000000000" pitchFamily="2" charset="0"/>
@@ -2071,23 +2055,7 @@
               <a:ea typeface="Roboto" panose="02000000000000000000" pitchFamily="2" charset="0"/>
               <a:cs typeface="Roboto" panose="02000000000000000000" pitchFamily="2" charset="0"/>
             </a:rPr>
-            <a:t>What does MVS from the </a:t>
-          </a:r>
-          <a:r>
-            <a:rPr lang="en-US" sz="1800" b="1" kern="1200" dirty="0" smtClean="0">
-              <a:latin typeface="Roboto" panose="02000000000000000000" pitchFamily="2" charset="0"/>
-              <a:ea typeface="Roboto" panose="02000000000000000000" pitchFamily="2" charset="0"/>
-              <a:cs typeface="Roboto" panose="02000000000000000000" pitchFamily="2" charset="0"/>
-            </a:rPr>
-            <a:t>E-Land </a:t>
-          </a:r>
-          <a:r>
-            <a:rPr lang="en-US" sz="1800" b="1" kern="1200" dirty="0" smtClean="0">
-              <a:latin typeface="Roboto" panose="02000000000000000000" pitchFamily="2" charset="0"/>
-              <a:ea typeface="Roboto" panose="02000000000000000000" pitchFamily="2" charset="0"/>
-              <a:cs typeface="Roboto" panose="02000000000000000000" pitchFamily="2" charset="0"/>
-            </a:rPr>
-            <a:t>toolbox do?</a:t>
+            <a:t>What does MVS from the E-Land toolbox do?</a:t>
           </a:r>
           <a:endParaRPr lang="en-US" sz="1800" b="1" kern="1200" dirty="0">
             <a:latin typeface="Roboto" panose="02000000000000000000" pitchFamily="2" charset="0"/>
@@ -16075,7 +16043,7 @@
             </a:r>
             <a:r>
               <a:rPr lang="de-DE" sz="2400" b="1" dirty="0" err="1" smtClean="0"/>
-              <a:t>stundets</a:t>
+              <a:t>students</a:t>
             </a:r>
             <a:endParaRPr lang="de-DE" sz="2400" b="1" dirty="0" smtClean="0"/>
           </a:p>

</xml_diff>